<commit_message>
Add logo to thumbnail template
</commit_message>
<xml_diff>
--- a/ehden_academy_video_thumbnail_template.pptx
+++ b/ehden_academy_video_thumbnail_template.pptx
@@ -6,7 +6,9 @@
   </p:sldMasterIdLst>
   <p:sldIdLst>
     <p:sldId id="256" r:id="rId2"/>
-    <p:sldId id="257" r:id="rId3"/>
+    <p:sldId id="258" r:id="rId3"/>
+    <p:sldId id="259" r:id="rId4"/>
+    <p:sldId id="257" r:id="rId5"/>
   </p:sldIdLst>
   <p:sldSz cx="18288000" cy="10287000"/>
   <p:notesSz cx="9144000" cy="6858000"/>
@@ -105,6 +107,11 @@
       </a:defRPr>
     </a:lvl9pPr>
   </p:defaultTextStyle>
+  <p:extLst>
+    <p:ext uri="{EFAFB233-063F-42B5-8137-9DF3F51BA10A}">
+      <p15:sldGuideLst xmlns:p15="http://schemas.microsoft.com/office/powerpoint/2012/main"/>
+    </p:ext>
+  </p:extLst>
 </p:presentation>
 </file>
 
@@ -556,7 +563,7 @@
           <a:p>
             <a:fld id="{7BC7A15B-0BEC-46F1-ADC0-234C820E9CD5}" type="datetimeFigureOut">
               <a:rPr lang="en-US" smtClean="0"/>
-              <a:t>25/02/2019</a:t>
+              <a:t>5/31/19</a:t>
             </a:fld>
             <a:endParaRPr lang="en-US"/>
           </a:p>
@@ -769,7 +776,7 @@
           <a:p>
             <a:fld id="{7BC7A15B-0BEC-46F1-ADC0-234C820E9CD5}" type="datetimeFigureOut">
               <a:rPr lang="en-US" smtClean="0"/>
-              <a:t>25/02/2019</a:t>
+              <a:t>5/31/19</a:t>
             </a:fld>
             <a:endParaRPr lang="en-US"/>
           </a:p>
@@ -1188,7 +1195,7 @@
           <a:p>
             <a:r>
               <a:rPr lang="en-US" dirty="0"/>
-              <a:t>Course Introduction</a:t>
+              <a:t>Using OHDSI Tools</a:t>
             </a:r>
           </a:p>
         </p:txBody>
@@ -1216,7 +1223,7 @@
           <a:p>
             <a:r>
               <a:rPr lang="en-US" dirty="0"/>
-              <a:t>Christian Reich</a:t>
+              <a:t>Mui Van Zandt</a:t>
             </a:r>
           </a:p>
         </p:txBody>
@@ -1254,6 +1261,42 @@
           </a:p>
         </p:txBody>
       </p:sp>
+      <p:pic>
+        <p:nvPicPr>
+          <p:cNvPr id="7" name="Picture 6">
+            <a:extLst>
+              <a:ext uri="{FF2B5EF4-FFF2-40B4-BE49-F238E27FC236}">
+                <a16:creationId xmlns:a16="http://schemas.microsoft.com/office/drawing/2014/main" id="{84BD45A7-634C-8948-8760-72D06DA59FE6}"/>
+              </a:ext>
+            </a:extLst>
+          </p:cNvPr>
+          <p:cNvPicPr>
+            <a:picLocks noChangeAspect="1"/>
+          </p:cNvPicPr>
+          <p:nvPr/>
+        </p:nvPicPr>
+        <p:blipFill>
+          <a:blip r:embed="rId2">
+            <a:extLst>
+              <a:ext uri="{28A0092B-C50C-407E-A947-70E740481C1C}">
+                <a14:useLocalDpi xmlns:a14="http://schemas.microsoft.com/office/drawing/2010/main" val="0"/>
+              </a:ext>
+            </a:extLst>
+          </a:blip>
+          <a:stretch>
+            <a:fillRect/>
+          </a:stretch>
+        </p:blipFill>
+        <p:spPr>
+          <a:xfrm>
+            <a:off x="6019876" y="6727837"/>
+            <a:ext cx="6248248" cy="1584889"/>
+          </a:xfrm>
+          <a:prstGeom prst="rect">
+            <a:avLst/>
+          </a:prstGeom>
+        </p:spPr>
+      </p:pic>
     </p:spTree>
     <p:extLst>
       <p:ext uri="{BB962C8B-B14F-4D97-AF65-F5344CB8AC3E}">
@@ -1268,6 +1311,267 @@
 </file>
 
 <file path=ppt/slides/slide2.xml><?xml version="1.0" encoding="utf-8"?>
+<p:sld xmlns:a="http://schemas.openxmlformats.org/drawingml/2006/main" xmlns:r="http://schemas.openxmlformats.org/officeDocument/2006/relationships" xmlns:p="http://schemas.openxmlformats.org/presentationml/2006/main">
+  <p:cSld>
+    <p:spTree>
+      <p:nvGrpSpPr>
+        <p:cNvPr id="1" name=""/>
+        <p:cNvGrpSpPr/>
+        <p:nvPr/>
+      </p:nvGrpSpPr>
+      <p:grpSpPr>
+        <a:xfrm>
+          <a:off x="0" y="0"/>
+          <a:ext cx="0" cy="0"/>
+          <a:chOff x="0" y="0"/>
+          <a:chExt cx="0" cy="0"/>
+        </a:xfrm>
+      </p:grpSpPr>
+      <p:sp>
+        <p:nvSpPr>
+          <p:cNvPr id="10" name="Title 9">
+            <a:extLst>
+              <a:ext uri="{FF2B5EF4-FFF2-40B4-BE49-F238E27FC236}">
+                <a16:creationId xmlns:a16="http://schemas.microsoft.com/office/drawing/2014/main" id="{62F86B77-C541-4009-969E-FA2E66F6156C}"/>
+              </a:ext>
+            </a:extLst>
+          </p:cNvPr>
+          <p:cNvSpPr>
+            <a:spLocks noGrp="1"/>
+          </p:cNvSpPr>
+          <p:nvPr>
+            <p:ph type="ctrTitle"/>
+          </p:nvPr>
+        </p:nvSpPr>
+        <p:spPr>
+          <a:xfrm>
+            <a:off x="5597236" y="4142509"/>
+            <a:ext cx="10404764" cy="1579636"/>
+          </a:xfrm>
+        </p:spPr>
+        <p:txBody>
+          <a:bodyPr>
+            <a:normAutofit fontScale="90000"/>
+          </a:bodyPr>
+          <a:lstStyle/>
+          <a:p>
+            <a:r>
+              <a:rPr lang="en-US" dirty="0"/>
+              <a:t>PROCEDURE_OCCURRENCE Table</a:t>
+            </a:r>
+          </a:p>
+        </p:txBody>
+      </p:sp>
+      <p:sp>
+        <p:nvSpPr>
+          <p:cNvPr id="11" name="Subtitle 10">
+            <a:extLst>
+              <a:ext uri="{FF2B5EF4-FFF2-40B4-BE49-F238E27FC236}">
+                <a16:creationId xmlns:a16="http://schemas.microsoft.com/office/drawing/2014/main" id="{D860AD48-EA21-4C62-8B5E-7BB1899F3A7D}"/>
+              </a:ext>
+            </a:extLst>
+          </p:cNvPr>
+          <p:cNvSpPr>
+            <a:spLocks noGrp="1"/>
+          </p:cNvSpPr>
+          <p:nvPr>
+            <p:ph type="subTitle" idx="1"/>
+          </p:nvPr>
+        </p:nvSpPr>
+        <p:spPr>
+          <a:xfrm>
+            <a:off x="5597236" y="5860257"/>
+            <a:ext cx="10404764" cy="2909669"/>
+          </a:xfrm>
+        </p:spPr>
+        <p:txBody>
+          <a:bodyPr/>
+          <a:lstStyle/>
+          <a:p>
+            <a:r>
+              <a:rPr lang="en-US" dirty="0"/>
+              <a:t>Erica Voss</a:t>
+            </a:r>
+          </a:p>
+        </p:txBody>
+      </p:sp>
+      <p:sp>
+        <p:nvSpPr>
+          <p:cNvPr id="12" name="Text Placeholder 11">
+            <a:extLst>
+              <a:ext uri="{FF2B5EF4-FFF2-40B4-BE49-F238E27FC236}">
+                <a16:creationId xmlns:a16="http://schemas.microsoft.com/office/drawing/2014/main" id="{B03AF351-3CDD-455C-B29B-37B223147C5F}"/>
+              </a:ext>
+            </a:extLst>
+          </p:cNvPr>
+          <p:cNvSpPr>
+            <a:spLocks noGrp="1"/>
+          </p:cNvSpPr>
+          <p:nvPr>
+            <p:ph type="body" sz="quarter" idx="10"/>
+          </p:nvPr>
+        </p:nvSpPr>
+        <p:spPr/>
+        <p:txBody>
+          <a:bodyPr>
+            <a:normAutofit fontScale="92500" lnSpcReduction="10000"/>
+          </a:bodyPr>
+          <a:lstStyle/>
+          <a:p>
+            <a:r>
+              <a:rPr lang="en-US" dirty="0"/>
+              <a:t>OMOP CDM and Standardized Vocabularies</a:t>
+            </a:r>
+          </a:p>
+          <a:p>
+            <a:endParaRPr lang="en-US" dirty="0"/>
+          </a:p>
+        </p:txBody>
+      </p:sp>
+      <p:pic>
+        <p:nvPicPr>
+          <p:cNvPr id="3" name="Picture 2">
+            <a:extLst>
+              <a:ext uri="{FF2B5EF4-FFF2-40B4-BE49-F238E27FC236}">
+                <a16:creationId xmlns:a16="http://schemas.microsoft.com/office/drawing/2014/main" id="{E058836E-667A-8949-A5A7-DB3DA8C359EF}"/>
+              </a:ext>
+            </a:extLst>
+          </p:cNvPr>
+          <p:cNvPicPr>
+            <a:picLocks noChangeAspect="1"/>
+          </p:cNvPicPr>
+          <p:nvPr/>
+        </p:nvPicPr>
+        <p:blipFill>
+          <a:blip r:embed="rId2">
+            <a:extLst>
+              <a:ext uri="{28A0092B-C50C-407E-A947-70E740481C1C}">
+                <a14:useLocalDpi xmlns:a14="http://schemas.microsoft.com/office/drawing/2010/main" val="0"/>
+              </a:ext>
+            </a:extLst>
+          </a:blip>
+          <a:stretch>
+            <a:fillRect/>
+          </a:stretch>
+        </p:blipFill>
+        <p:spPr>
+          <a:xfrm>
+            <a:off x="6019876" y="6727837"/>
+            <a:ext cx="6248248" cy="1584889"/>
+          </a:xfrm>
+          <a:prstGeom prst="rect">
+            <a:avLst/>
+          </a:prstGeom>
+        </p:spPr>
+      </p:pic>
+    </p:spTree>
+    <p:extLst>
+      <p:ext uri="{BB962C8B-B14F-4D97-AF65-F5344CB8AC3E}">
+        <p14:creationId xmlns:p14="http://schemas.microsoft.com/office/powerpoint/2010/main" val="4213197939"/>
+      </p:ext>
+    </p:extLst>
+  </p:cSld>
+  <p:clrMapOvr>
+    <a:masterClrMapping/>
+  </p:clrMapOvr>
+</p:sld>
+</file>
+
+<file path=ppt/slides/slide3.xml><?xml version="1.0" encoding="utf-8"?>
+<p:sld xmlns:a="http://schemas.openxmlformats.org/drawingml/2006/main" xmlns:r="http://schemas.openxmlformats.org/officeDocument/2006/relationships" xmlns:p="http://schemas.openxmlformats.org/presentationml/2006/main">
+  <p:cSld>
+    <p:spTree>
+      <p:nvGrpSpPr>
+        <p:cNvPr id="1" name=""/>
+        <p:cNvGrpSpPr/>
+        <p:nvPr/>
+      </p:nvGrpSpPr>
+      <p:grpSpPr>
+        <a:xfrm>
+          <a:off x="0" y="0"/>
+          <a:ext cx="0" cy="0"/>
+          <a:chOff x="0" y="0"/>
+          <a:chExt cx="0" cy="0"/>
+        </a:xfrm>
+      </p:grpSpPr>
+      <p:sp>
+        <p:nvSpPr>
+          <p:cNvPr id="2" name="Title 1">
+            <a:extLst>
+              <a:ext uri="{FF2B5EF4-FFF2-40B4-BE49-F238E27FC236}">
+                <a16:creationId xmlns:a16="http://schemas.microsoft.com/office/drawing/2014/main" id="{92CF1C30-BBBB-9B41-8F1B-2B3E96D47E08}"/>
+              </a:ext>
+            </a:extLst>
+          </p:cNvPr>
+          <p:cNvSpPr>
+            <a:spLocks noGrp="1"/>
+          </p:cNvSpPr>
+          <p:nvPr>
+            <p:ph type="title"/>
+          </p:nvPr>
+        </p:nvSpPr>
+        <p:spPr/>
+        <p:txBody>
+          <a:bodyPr/>
+          <a:lstStyle/>
+          <a:p>
+            <a:r>
+              <a:rPr lang="en-US" dirty="0"/>
+              <a:t>Logos</a:t>
+            </a:r>
+          </a:p>
+        </p:txBody>
+      </p:sp>
+      <p:pic>
+        <p:nvPicPr>
+          <p:cNvPr id="4" name="Picture 3">
+            <a:extLst>
+              <a:ext uri="{FF2B5EF4-FFF2-40B4-BE49-F238E27FC236}">
+                <a16:creationId xmlns:a16="http://schemas.microsoft.com/office/drawing/2014/main" id="{255B90E5-8314-2F4C-B9E8-134B5BF1175A}"/>
+              </a:ext>
+            </a:extLst>
+          </p:cNvPr>
+          <p:cNvPicPr>
+            <a:picLocks noChangeAspect="1"/>
+          </p:cNvPicPr>
+          <p:nvPr/>
+        </p:nvPicPr>
+        <p:blipFill>
+          <a:blip r:embed="rId2">
+            <a:extLst>
+              <a:ext uri="{28A0092B-C50C-407E-A947-70E740481C1C}">
+                <a14:useLocalDpi xmlns:a14="http://schemas.microsoft.com/office/drawing/2010/main" val="0"/>
+              </a:ext>
+            </a:extLst>
+          </a:blip>
+          <a:stretch>
+            <a:fillRect/>
+          </a:stretch>
+        </p:blipFill>
+        <p:spPr>
+          <a:xfrm>
+            <a:off x="1257300" y="2536033"/>
+            <a:ext cx="6248248" cy="1584889"/>
+          </a:xfrm>
+          <a:prstGeom prst="rect">
+            <a:avLst/>
+          </a:prstGeom>
+        </p:spPr>
+      </p:pic>
+    </p:spTree>
+    <p:extLst>
+      <p:ext uri="{BB962C8B-B14F-4D97-AF65-F5344CB8AC3E}">
+        <p14:creationId xmlns:p14="http://schemas.microsoft.com/office/powerpoint/2010/main" val="1944447119"/>
+      </p:ext>
+    </p:extLst>
+  </p:cSld>
+  <p:clrMapOvr>
+    <a:masterClrMapping/>
+  </p:clrMapOvr>
+</p:sld>
+</file>
+
+<file path=ppt/slides/slide4.xml><?xml version="1.0" encoding="utf-8"?>
 <p:sld xmlns:a="http://schemas.openxmlformats.org/drawingml/2006/main" xmlns:r="http://schemas.openxmlformats.org/officeDocument/2006/relationships" xmlns:p="http://schemas.openxmlformats.org/presentationml/2006/main">
   <p:cSld>
     <p:spTree>

</xml_diff>